<commit_message>
issue #1: Update the code at the repository with version 0.5.0
</commit_message>
<xml_diff>
--- a/doc/slides/AMIDST_slides.pptx
+++ b/doc/slides/AMIDST_slides.pptx
@@ -6714,8 +6714,8 @@
         </p:nvSpPr>
         <p:spPr>
           <a:xfrm>
-            <a:off x="6705600" y="4753927"/>
-            <a:ext cx="1219200" cy="400110"/>
+            <a:off x="5867400" y="4753927"/>
+            <a:ext cx="2750964" cy="400110"/>
           </a:xfrm>
           <a:prstGeom prst="rect">
             <a:avLst/>
@@ -6729,8 +6729,8 @@
           <a:lstStyle/>
           <a:p>
             <a:r>
-              <a:rPr lang="en-US" sz="2000" smtClean="0"/>
-              <a:t>Static BN</a:t>
+              <a:rPr lang="en-US" sz="2000" dirty="0" smtClean="0"/>
+              <a:t>Factor Analysis Model</a:t>
             </a:r>
             <a:endParaRPr lang="en-US" sz="2000" dirty="0"/>
           </a:p>
@@ -8388,36 +8388,6 @@
               <a:t>13</a:t>
             </a:fld>
             <a:endParaRPr lang="en-US"/>
-          </a:p>
-        </p:txBody>
-      </p:sp>
-      <p:sp>
-        <p:nvSpPr>
-          <p:cNvPr id="3" name="TextBox 2"/>
-          <p:cNvSpPr txBox="1"/>
-          <p:nvPr/>
-        </p:nvSpPr>
-        <p:spPr>
-          <a:xfrm>
-            <a:off x="952500" y="4753927"/>
-            <a:ext cx="1485900" cy="400110"/>
-          </a:xfrm>
-          <a:prstGeom prst="rect">
-            <a:avLst/>
-          </a:prstGeom>
-          <a:noFill/>
-        </p:spPr>
-        <p:txBody>
-          <a:bodyPr wrap="square" rtlCol="0">
-            <a:spAutoFit/>
-          </a:bodyPr>
-          <a:lstStyle/>
-          <a:p>
-            <a:r>
-              <a:rPr lang="en-US" sz="2000" dirty="0" smtClean="0"/>
-              <a:t>Static BN</a:t>
-            </a:r>
-            <a:endParaRPr lang="en-US" sz="2000" dirty="0"/>
           </a:p>
         </p:txBody>
       </p:sp>
@@ -10657,6 +10627,36 @@
           </a:p>
         </p:txBody>
       </p:sp>
+      <p:sp>
+        <p:nvSpPr>
+          <p:cNvPr id="73" name="TextBox 72"/>
+          <p:cNvSpPr txBox="1"/>
+          <p:nvPr/>
+        </p:nvSpPr>
+        <p:spPr>
+          <a:xfrm>
+            <a:off x="258543" y="4766032"/>
+            <a:ext cx="2750964" cy="400110"/>
+          </a:xfrm>
+          <a:prstGeom prst="rect">
+            <a:avLst/>
+          </a:prstGeom>
+          <a:noFill/>
+        </p:spPr>
+        <p:txBody>
+          <a:bodyPr wrap="square" rtlCol="0">
+            <a:spAutoFit/>
+          </a:bodyPr>
+          <a:lstStyle/>
+          <a:p>
+            <a:r>
+              <a:rPr lang="en-US" sz="2000" dirty="0" smtClean="0"/>
+              <a:t>Factor Analysis Model</a:t>
+            </a:r>
+            <a:endParaRPr lang="en-US" sz="2000" dirty="0"/>
+          </a:p>
+        </p:txBody>
+      </p:sp>
     </p:spTree>
     <p:extLst>
       <p:ext uri="{BB962C8B-B14F-4D97-AF65-F5344CB8AC3E}">
@@ -12460,36 +12460,6 @@
           </a:p>
         </p:txBody>
       </p:sp>
-      <p:sp>
-        <p:nvSpPr>
-          <p:cNvPr id="101" name="TextBox 100"/>
-          <p:cNvSpPr txBox="1"/>
-          <p:nvPr/>
-        </p:nvSpPr>
-        <p:spPr>
-          <a:xfrm>
-            <a:off x="6705600" y="4753927"/>
-            <a:ext cx="1219200" cy="400110"/>
-          </a:xfrm>
-          <a:prstGeom prst="rect">
-            <a:avLst/>
-          </a:prstGeom>
-          <a:noFill/>
-        </p:spPr>
-        <p:txBody>
-          <a:bodyPr wrap="square" rtlCol="0">
-            <a:spAutoFit/>
-          </a:bodyPr>
-          <a:lstStyle/>
-          <a:p>
-            <a:r>
-              <a:rPr lang="en-US" sz="2000" smtClean="0"/>
-              <a:t>Static BN</a:t>
-            </a:r>
-            <a:endParaRPr lang="en-US" sz="2000" dirty="0"/>
-          </a:p>
-        </p:txBody>
-      </p:sp>
       <p:pic>
         <p:nvPicPr>
           <p:cNvPr id="7" name="Picture 6"/>
@@ -13609,6 +13579,36 @@
           </a:p>
         </p:txBody>
       </p:sp>
+      <p:sp>
+        <p:nvSpPr>
+          <p:cNvPr id="68" name="TextBox 67"/>
+          <p:cNvSpPr txBox="1"/>
+          <p:nvPr/>
+        </p:nvSpPr>
+        <p:spPr>
+          <a:xfrm>
+            <a:off x="5867400" y="4753927"/>
+            <a:ext cx="2750964" cy="400110"/>
+          </a:xfrm>
+          <a:prstGeom prst="rect">
+            <a:avLst/>
+          </a:prstGeom>
+          <a:noFill/>
+        </p:spPr>
+        <p:txBody>
+          <a:bodyPr wrap="square" rtlCol="0">
+            <a:spAutoFit/>
+          </a:bodyPr>
+          <a:lstStyle/>
+          <a:p>
+            <a:r>
+              <a:rPr lang="en-US" sz="2000" dirty="0" smtClean="0"/>
+              <a:t>Factor Analysis Model</a:t>
+            </a:r>
+            <a:endParaRPr lang="en-US" sz="2000" dirty="0"/>
+          </a:p>
+        </p:txBody>
+      </p:sp>
     </p:spTree>
     <p:extLst>
       <p:ext uri="{BB962C8B-B14F-4D97-AF65-F5344CB8AC3E}">
@@ -13668,6 +13668,7 @@
           </a:bodyPr>
           <a:lstStyle/>
           <a:p>
+            <a:pPr algn="r"/>
             <a:r>
               <a:rPr lang="en-GB" sz="2800" dirty="0" smtClean="0"/>
               <a:t>Static</a:t>
@@ -13677,12 +13678,23 @@
               <a:t> models (learning from </a:t>
             </a:r>
             <a:r>
+              <a:rPr lang="en-GB" sz="2800" dirty="0" err="1"/>
+              <a:t>F</a:t>
+            </a:r>
+            <a:r>
               <a:rPr lang="en-GB" sz="2800" baseline="0" dirty="0" err="1" smtClean="0"/>
-              <a:t>flink</a:t>
+              <a:t>link</a:t>
             </a:r>
             <a:r>
               <a:rPr lang="en-GB" sz="2800" baseline="0" dirty="0" smtClean="0"/>
               <a:t>)</a:t>
+            </a:r>
+            <a:br>
+              <a:rPr lang="en-GB" sz="2800" baseline="0" dirty="0" smtClean="0"/>
+            </a:br>
+            <a:r>
+              <a:rPr lang="en-GB" sz="1600" dirty="0" smtClean="0"/>
+              <a:t>[Spark coming soon]</a:t>
             </a:r>
             <a:endParaRPr lang="en-GB" sz="2800" dirty="0"/>
           </a:p>
@@ -17706,12 +17718,33 @@
         </p:nvSpPr>
         <p:spPr/>
         <p:txBody>
-          <a:bodyPr/>
+          <a:bodyPr>
+            <a:normAutofit fontScale="90000"/>
+          </a:bodyPr>
           <a:lstStyle/>
           <a:p>
             <a:r>
               <a:rPr lang="en-US" dirty="0" smtClean="0"/>
-              <a:t>Static models (inference)</a:t>
+              <a:t>Static models (inference</a:t>
+            </a:r>
+            <a:r>
+              <a:rPr lang="en-US" dirty="0" smtClean="0"/>
+              <a:t>)</a:t>
+            </a:r>
+            <a:br>
+              <a:rPr lang="en-US" dirty="0" smtClean="0"/>
+            </a:br>
+            <a:r>
+              <a:rPr lang="en-GB" sz="2000" dirty="0"/>
+              <a:t>[</a:t>
+            </a:r>
+            <a:r>
+              <a:rPr lang="en-GB" sz="2000" dirty="0" err="1"/>
+              <a:t>Flink</a:t>
+            </a:r>
+            <a:r>
+              <a:rPr lang="en-GB" sz="2000" dirty="0"/>
+              <a:t> support coming soon]</a:t>
             </a:r>
             <a:endParaRPr lang="en-US" dirty="0"/>
           </a:p>
@@ -21258,8 +21291,8 @@
         </p:nvSpPr>
         <p:spPr>
           <a:xfrm>
-            <a:off x="6705600" y="4753927"/>
-            <a:ext cx="1524000" cy="400110"/>
+            <a:off x="5486400" y="4753927"/>
+            <a:ext cx="3581400" cy="707886"/>
           </a:xfrm>
           <a:prstGeom prst="rect">
             <a:avLst/>
@@ -21272,9 +21305,17 @@
           </a:bodyPr>
           <a:lstStyle/>
           <a:p>
-            <a:r>
-              <a:rPr lang="en-US" sz="2000" smtClean="0"/>
-              <a:t>Dynamic BN</a:t>
+            <a:pPr algn="ctr"/>
+            <a:r>
+              <a:rPr lang="en-US" sz="2000" dirty="0" smtClean="0"/>
+              <a:t>Hidden Markov Model</a:t>
+            </a:r>
+          </a:p>
+          <a:p>
+            <a:pPr algn="ctr"/>
+            <a:r>
+              <a:rPr lang="en-US" sz="2000" dirty="0" smtClean="0"/>
+              <a:t>(Dynamic BN)</a:t>
             </a:r>
             <a:endParaRPr lang="en-US" sz="2000" dirty="0"/>
           </a:p>
@@ -23193,7 +23234,9 @@
         </p:nvSpPr>
         <p:spPr/>
         <p:txBody>
-          <a:bodyPr/>
+          <a:bodyPr>
+            <a:normAutofit fontScale="90000"/>
+          </a:bodyPr>
           <a:lstStyle/>
           <a:p>
             <a:r>
@@ -23202,9 +23245,28 @@
             </a:r>
             <a:r>
               <a:rPr lang="en-GB" baseline="0" dirty="0" smtClean="0"/>
-              <a:t>models (learning)</a:t>
-            </a:r>
-            <a:endParaRPr lang="en-GB" dirty="0"/>
+              <a:t>models (learning</a:t>
+            </a:r>
+            <a:r>
+              <a:rPr lang="en-GB" baseline="0" dirty="0" smtClean="0"/>
+              <a:t>)</a:t>
+            </a:r>
+            <a:br>
+              <a:rPr lang="en-GB" baseline="0" dirty="0" smtClean="0"/>
+            </a:br>
+            <a:r>
+              <a:rPr lang="en-GB" sz="2000" dirty="0"/>
+              <a:t>[</a:t>
+            </a:r>
+            <a:r>
+              <a:rPr lang="en-GB" sz="2000" dirty="0" err="1"/>
+              <a:t>Flink</a:t>
+            </a:r>
+            <a:r>
+              <a:rPr lang="en-GB" sz="2000" dirty="0"/>
+              <a:t> support coming soon]</a:t>
+            </a:r>
+            <a:endParaRPr lang="en-GB" sz="2000" dirty="0"/>
           </a:p>
         </p:txBody>
       </p:sp>
@@ -23707,36 +23769,6 @@
               <a:t>25</a:t>
             </a:fld>
             <a:endParaRPr lang="en-US"/>
-          </a:p>
-        </p:txBody>
-      </p:sp>
-      <p:sp>
-        <p:nvSpPr>
-          <p:cNvPr id="3" name="TextBox 2"/>
-          <p:cNvSpPr txBox="1"/>
-          <p:nvPr/>
-        </p:nvSpPr>
-        <p:spPr>
-          <a:xfrm>
-            <a:off x="952500" y="4753927"/>
-            <a:ext cx="1485900" cy="400110"/>
-          </a:xfrm>
-          <a:prstGeom prst="rect">
-            <a:avLst/>
-          </a:prstGeom>
-          <a:noFill/>
-        </p:spPr>
-        <p:txBody>
-          <a:bodyPr wrap="square" rtlCol="0">
-            <a:spAutoFit/>
-          </a:bodyPr>
-          <a:lstStyle/>
-          <a:p>
-            <a:r>
-              <a:rPr lang="en-US" sz="2000" dirty="0" smtClean="0"/>
-              <a:t>Dynamic BN</a:t>
-            </a:r>
-            <a:endParaRPr lang="en-US" sz="2000" dirty="0"/>
           </a:p>
         </p:txBody>
       </p:sp>
@@ -27007,6 +27039,44 @@
           </a:p>
         </p:txBody>
       </p:sp>
+      <p:sp>
+        <p:nvSpPr>
+          <p:cNvPr id="95" name="TextBox 94"/>
+          <p:cNvSpPr txBox="1"/>
+          <p:nvPr/>
+        </p:nvSpPr>
+        <p:spPr>
+          <a:xfrm>
+            <a:off x="-209572" y="4632381"/>
+            <a:ext cx="3581400" cy="707886"/>
+          </a:xfrm>
+          <a:prstGeom prst="rect">
+            <a:avLst/>
+          </a:prstGeom>
+          <a:noFill/>
+        </p:spPr>
+        <p:txBody>
+          <a:bodyPr wrap="square" rtlCol="0">
+            <a:spAutoFit/>
+          </a:bodyPr>
+          <a:lstStyle/>
+          <a:p>
+            <a:pPr algn="ctr"/>
+            <a:r>
+              <a:rPr lang="en-US" sz="2000" dirty="0" smtClean="0"/>
+              <a:t>Hidden Markov Model</a:t>
+            </a:r>
+          </a:p>
+          <a:p>
+            <a:pPr algn="ctr"/>
+            <a:r>
+              <a:rPr lang="en-US" sz="2000" dirty="0" smtClean="0"/>
+              <a:t>(Dynamic BN)</a:t>
+            </a:r>
+            <a:endParaRPr lang="en-US" sz="2000" dirty="0"/>
+          </a:p>
+        </p:txBody>
+      </p:sp>
     </p:spTree>
     <p:extLst>
       <p:ext uri="{BB962C8B-B14F-4D97-AF65-F5344CB8AC3E}">
@@ -27210,15 +27280,23 @@
           <a:p>
             <a:r>
               <a:rPr lang="en-US" sz="1600" i="1" dirty="0"/>
-              <a:t>// Save with .</a:t>
-            </a:r>
-            <a:r>
-              <a:rPr lang="en-US" sz="1600" i="1" dirty="0" err="1"/>
-              <a:t>bn</a:t>
+              <a:t>// Save with </a:t>
+            </a:r>
+            <a:r>
+              <a:rPr lang="en-US" sz="1600" i="1" dirty="0" smtClean="0"/>
+              <a:t>.</a:t>
+            </a:r>
+            <a:r>
+              <a:rPr lang="en-US" sz="1600" i="1" dirty="0" err="1" smtClean="0"/>
+              <a:t>dbn</a:t>
+            </a:r>
+            <a:r>
+              <a:rPr lang="en-US" sz="1600" i="1" dirty="0" smtClean="0"/>
+              <a:t> </a:t>
             </a:r>
             <a:r>
               <a:rPr lang="en-US" sz="1600" i="1" dirty="0"/>
-              <a:t> format</a:t>
+              <a:t>format</a:t>
             </a:r>
             <a:br>
               <a:rPr lang="en-US" sz="1600" i="1" dirty="0"/>
@@ -27283,18 +27361,18 @@
             </a:r>
             <a:r>
               <a:rPr lang="en-US" sz="1600" i="1" dirty="0"/>
-              <a:t> format</a:t>
+              <a:t> </a:t>
+            </a:r>
+            <a:r>
+              <a:rPr lang="en-US" sz="1600" i="1" dirty="0" smtClean="0"/>
+              <a:t>format. Not full compatibility.</a:t>
             </a:r>
             <a:br>
-              <a:rPr lang="en-US" sz="1600" i="1" dirty="0"/>
+              <a:rPr lang="en-US" sz="1600" i="1" dirty="0" smtClean="0"/>
             </a:br>
             <a:r>
-              <a:rPr lang="en-US" sz="1600" dirty="0" err="1"/>
-              <a:t>DynamicBayesianNetworkWriterToHugin</a:t>
-            </a:r>
-            <a:r>
               <a:rPr lang="en-US" sz="1600" dirty="0" err="1" smtClean="0"/>
-              <a:t>.</a:t>
+              <a:t>DynamicBayesianNetworkWriterToHugin.</a:t>
             </a:r>
             <a:r>
               <a:rPr lang="en-US" sz="1600" i="1" dirty="0" err="1" smtClean="0"/>
@@ -27579,36 +27657,6 @@
           </a:p>
         </p:txBody>
       </p:sp>
-      <p:sp>
-        <p:nvSpPr>
-          <p:cNvPr id="3" name="TextBox 2"/>
-          <p:cNvSpPr txBox="1"/>
-          <p:nvPr/>
-        </p:nvSpPr>
-        <p:spPr>
-          <a:xfrm>
-            <a:off x="952500" y="4753927"/>
-            <a:ext cx="1485900" cy="400110"/>
-          </a:xfrm>
-          <a:prstGeom prst="rect">
-            <a:avLst/>
-          </a:prstGeom>
-          <a:noFill/>
-        </p:spPr>
-        <p:txBody>
-          <a:bodyPr wrap="square" rtlCol="0">
-            <a:spAutoFit/>
-          </a:bodyPr>
-          <a:lstStyle/>
-          <a:p>
-            <a:r>
-              <a:rPr lang="en-US" sz="2000" dirty="0" smtClean="0"/>
-              <a:t>Dynamic BN</a:t>
-            </a:r>
-            <a:endParaRPr lang="en-US" sz="2000" dirty="0"/>
-          </a:p>
-        </p:txBody>
-      </p:sp>
       <p:grpSp>
         <p:nvGrpSpPr>
           <p:cNvPr id="98" name="Group 97"/>
@@ -28590,7 +28638,7 @@
         </p:nvSpPr>
         <p:spPr>
           <a:xfrm>
-            <a:off x="7315200" y="4788072"/>
+            <a:off x="7039340" y="4750643"/>
             <a:ext cx="1463480" cy="400110"/>
           </a:xfrm>
           <a:prstGeom prst="rect">
@@ -28605,8 +28653,12 @@
           <a:lstStyle/>
           <a:p>
             <a:r>
+              <a:rPr lang="en-US" sz="2000"/>
+              <a:t>Q</a:t>
+            </a:r>
+            <a:r>
               <a:rPr lang="en-US" sz="2000" smtClean="0"/>
-              <a:t>querry</a:t>
+              <a:t>uery</a:t>
             </a:r>
             <a:endParaRPr lang="en-US" sz="2000" dirty="0"/>
           </a:p>
@@ -30834,8 +30886,8 @@
           </a:p>
         </p:txBody>
       </p:sp>
-      <mc:AlternateContent xmlns:mc="http://schemas.openxmlformats.org/markup-compatibility/2006" xmlns:a14="http://schemas.microsoft.com/office/drawing/2010/main">
-        <mc:Choice Requires="a14">
+      <mc:AlternateContent xmlns:mc="http://schemas.openxmlformats.org/markup-compatibility/2006">
+        <mc:Choice xmlns:a14="http://schemas.microsoft.com/office/drawing/2010/main" Requires="a14">
           <p:sp>
             <p:nvSpPr>
               <p:cNvPr id="95" name="Rectangle 94"/>
@@ -30977,132 +31029,6 @@
                       <m:sSup>
                         <m:sSupPr>
                           <m:ctrlPr>
-                            <a:rPr lang="es-ES" i="1" dirty="0">
-                              <a:ln w="0"/>
-                              <a:solidFill>
-                                <a:srgbClr val="6DA4FA"/>
-                              </a:solidFill>
-                              <a:effectLst>
-                                <a:outerShdw blurRad="38100" dist="25400" dir="5400000" algn="ctr" rotWithShape="0">
-                                  <a:srgbClr val="6E747A">
-                                    <a:alpha val="43000"/>
-                                  </a:srgbClr>
-                                </a:outerShdw>
-                              </a:effectLst>
-                              <a:latin typeface="Cambria Math" charset="0"/>
-                            </a:rPr>
-                          </m:ctrlPr>
-                        </m:sSupPr>
-                        <m:e>
-                          <m:r>
-                            <a:rPr lang="es-ES" i="1" dirty="0">
-                              <a:ln w="0"/>
-                              <a:solidFill>
-                                <a:srgbClr val="6DA4FA"/>
-                              </a:solidFill>
-                              <a:effectLst>
-                                <a:outerShdw blurRad="38100" dist="25400" dir="5400000" algn="ctr" rotWithShape="0">
-                                  <a:srgbClr val="6E747A">
-                                    <a:alpha val="43000"/>
-                                  </a:srgbClr>
-                                </a:outerShdw>
-                              </a:effectLst>
-                              <a:latin typeface="Cambria Math" charset="0"/>
-                            </a:rPr>
-                            <m:t>𝐻</m:t>
-                          </m:r>
-                        </m:e>
-                        <m:sup>
-                          <m:r>
-                            <a:rPr lang="es-ES" i="1" dirty="0">
-                              <a:ln w="0"/>
-                              <a:solidFill>
-                                <a:srgbClr val="6DA4FA"/>
-                              </a:solidFill>
-                              <a:effectLst>
-                                <a:outerShdw blurRad="38100" dist="25400" dir="5400000" algn="ctr" rotWithShape="0">
-                                  <a:srgbClr val="6E747A">
-                                    <a:alpha val="43000"/>
-                                  </a:srgbClr>
-                                </a:outerShdw>
-                              </a:effectLst>
-                              <a:latin typeface="Cambria Math" charset="0"/>
-                            </a:rPr>
-                            <m:t>𝑡</m:t>
-                          </m:r>
-                          <m:r>
-                            <a:rPr lang="es-ES" b="0" i="1" dirty="0" smtClean="0">
-                              <a:ln w="0"/>
-                              <a:solidFill>
-                                <a:srgbClr val="6DA4FA"/>
-                              </a:solidFill>
-                              <a:effectLst>
-                                <a:outerShdw blurRad="38100" dist="25400" dir="5400000" algn="ctr" rotWithShape="0">
-                                  <a:srgbClr val="6E747A">
-                                    <a:alpha val="43000"/>
-                                  </a:srgbClr>
-                                </a:outerShdw>
-                              </a:effectLst>
-                              <a:latin typeface="Cambria Math" charset="0"/>
-                            </a:rPr>
-                            <m:t>−1</m:t>
-                          </m:r>
-                        </m:sup>
-                      </m:sSup>
-                      <m:r>
-                        <a:rPr lang="es-ES" b="0" i="1" dirty="0" smtClean="0">
-                          <a:ln w="0"/>
-                          <a:solidFill>
-                            <a:srgbClr val="6DA4FA"/>
-                          </a:solidFill>
-                          <a:effectLst>
-                            <a:outerShdw blurRad="38100" dist="25400" dir="5400000" algn="ctr" rotWithShape="0">
-                              <a:srgbClr val="6E747A">
-                                <a:alpha val="43000"/>
-                              </a:srgbClr>
-                            </a:outerShdw>
-                          </a:effectLst>
-                          <a:latin typeface="Cambria Math" charset="0"/>
-                        </a:rPr>
-                        <m:t>=</m:t>
-                      </m:r>
-                      <m:r>
-                        <a:rPr lang="es-ES" b="0" i="1" dirty="0" smtClean="0">
-                          <a:ln w="0"/>
-                          <a:solidFill>
-                            <a:srgbClr val="6DA4FA"/>
-                          </a:solidFill>
-                          <a:effectLst>
-                            <a:outerShdw blurRad="38100" dist="25400" dir="5400000" algn="ctr" rotWithShape="0">
-                              <a:srgbClr val="6E747A">
-                                <a:alpha val="43000"/>
-                              </a:srgbClr>
-                            </a:outerShdw>
-                          </a:effectLst>
-                          <a:latin typeface="Cambria Math" charset="0"/>
-                        </a:rPr>
-                        <m:t>h</m:t>
-                      </m:r>
-                      <m:r>
-                        <a:rPr lang="es-ES" b="0" i="1" dirty="0" smtClean="0">
-                          <a:ln w="0"/>
-                          <a:solidFill>
-                            <a:srgbClr val="6DA4FA"/>
-                          </a:solidFill>
-                          <a:effectLst>
-                            <a:outerShdw blurRad="38100" dist="25400" dir="5400000" algn="ctr" rotWithShape="0">
-                              <a:srgbClr val="6E747A">
-                                <a:alpha val="43000"/>
-                              </a:srgbClr>
-                            </a:outerShdw>
-                          </a:effectLst>
-                          <a:latin typeface="Cambria Math" charset="0"/>
-                        </a:rPr>
-                        <m:t>,</m:t>
-                      </m:r>
-                      <m:sSup>
-                        <m:sSupPr>
-                          <m:ctrlPr>
                             <a:rPr lang="es-ES" b="0" i="1" dirty="0" smtClean="0">
                               <a:ln w="0"/>
                               <a:solidFill>
@@ -31229,7 +31155,7 @@
             </p:txBody>
           </p:sp>
         </mc:Choice>
-        <mc:Fallback xmlns="">
+        <mc:Fallback>
           <p:sp>
             <p:nvSpPr>
               <p:cNvPr id="95" name="Rectangle 94"/>
@@ -31268,8 +31194,8 @@
           </p:sp>
         </mc:Fallback>
       </mc:AlternateContent>
-      <mc:AlternateContent xmlns:mc="http://schemas.openxmlformats.org/markup-compatibility/2006" xmlns:a14="http://schemas.microsoft.com/office/drawing/2010/main">
-        <mc:Choice Requires="a14">
+      <mc:AlternateContent xmlns:mc="http://schemas.openxmlformats.org/markup-compatibility/2006">
+        <mc:Choice xmlns:a14="http://schemas.microsoft.com/office/drawing/2010/main" Requires="a14">
           <p:sp>
             <p:nvSpPr>
               <p:cNvPr id="96" name="Rectangle 95"/>
@@ -31428,132 +31354,6 @@
                       <m:sSup>
                         <m:sSupPr>
                           <m:ctrlPr>
-                            <a:rPr lang="es-ES" i="1" dirty="0">
-                              <a:ln w="0"/>
-                              <a:solidFill>
-                                <a:srgbClr val="6DA4FA"/>
-                              </a:solidFill>
-                              <a:effectLst>
-                                <a:outerShdw blurRad="38100" dist="25400" dir="5400000" algn="ctr" rotWithShape="0">
-                                  <a:srgbClr val="6E747A">
-                                    <a:alpha val="43000"/>
-                                  </a:srgbClr>
-                                </a:outerShdw>
-                              </a:effectLst>
-                              <a:latin typeface="Cambria Math" charset="0"/>
-                            </a:rPr>
-                          </m:ctrlPr>
-                        </m:sSupPr>
-                        <m:e>
-                          <m:r>
-                            <a:rPr lang="es-ES" i="1" dirty="0">
-                              <a:ln w="0"/>
-                              <a:solidFill>
-                                <a:srgbClr val="6DA4FA"/>
-                              </a:solidFill>
-                              <a:effectLst>
-                                <a:outerShdw blurRad="38100" dist="25400" dir="5400000" algn="ctr" rotWithShape="0">
-                                  <a:srgbClr val="6E747A">
-                                    <a:alpha val="43000"/>
-                                  </a:srgbClr>
-                                </a:outerShdw>
-                              </a:effectLst>
-                              <a:latin typeface="Cambria Math" charset="0"/>
-                            </a:rPr>
-                            <m:t>𝐻</m:t>
-                          </m:r>
-                        </m:e>
-                        <m:sup>
-                          <m:r>
-                            <a:rPr lang="es-ES" i="1" dirty="0">
-                              <a:ln w="0"/>
-                              <a:solidFill>
-                                <a:srgbClr val="6DA4FA"/>
-                              </a:solidFill>
-                              <a:effectLst>
-                                <a:outerShdw blurRad="38100" dist="25400" dir="5400000" algn="ctr" rotWithShape="0">
-                                  <a:srgbClr val="6E747A">
-                                    <a:alpha val="43000"/>
-                                  </a:srgbClr>
-                                </a:outerShdw>
-                              </a:effectLst>
-                              <a:latin typeface="Cambria Math" charset="0"/>
-                            </a:rPr>
-                            <m:t>𝑡</m:t>
-                          </m:r>
-                          <m:r>
-                            <a:rPr lang="es-ES" b="0" i="1" dirty="0" smtClean="0">
-                              <a:ln w="0"/>
-                              <a:solidFill>
-                                <a:srgbClr val="6DA4FA"/>
-                              </a:solidFill>
-                              <a:effectLst>
-                                <a:outerShdw blurRad="38100" dist="25400" dir="5400000" algn="ctr" rotWithShape="0">
-                                  <a:srgbClr val="6E747A">
-                                    <a:alpha val="43000"/>
-                                  </a:srgbClr>
-                                </a:outerShdw>
-                              </a:effectLst>
-                              <a:latin typeface="Cambria Math" charset="0"/>
-                            </a:rPr>
-                            <m:t>−1</m:t>
-                          </m:r>
-                        </m:sup>
-                      </m:sSup>
-                      <m:r>
-                        <a:rPr lang="es-ES" b="0" i="1" dirty="0" smtClean="0">
-                          <a:ln w="0"/>
-                          <a:solidFill>
-                            <a:srgbClr val="6DA4FA"/>
-                          </a:solidFill>
-                          <a:effectLst>
-                            <a:outerShdw blurRad="38100" dist="25400" dir="5400000" algn="ctr" rotWithShape="0">
-                              <a:srgbClr val="6E747A">
-                                <a:alpha val="43000"/>
-                              </a:srgbClr>
-                            </a:outerShdw>
-                          </a:effectLst>
-                          <a:latin typeface="Cambria Math" charset="0"/>
-                        </a:rPr>
-                        <m:t>=</m:t>
-                      </m:r>
-                      <m:r>
-                        <a:rPr lang="es-ES" b="0" i="1" dirty="0" smtClean="0">
-                          <a:ln w="0"/>
-                          <a:solidFill>
-                            <a:srgbClr val="6DA4FA"/>
-                          </a:solidFill>
-                          <a:effectLst>
-                            <a:outerShdw blurRad="38100" dist="25400" dir="5400000" algn="ctr" rotWithShape="0">
-                              <a:srgbClr val="6E747A">
-                                <a:alpha val="43000"/>
-                              </a:srgbClr>
-                            </a:outerShdw>
-                          </a:effectLst>
-                          <a:latin typeface="Cambria Math" charset="0"/>
-                        </a:rPr>
-                        <m:t>h</m:t>
-                      </m:r>
-                      <m:r>
-                        <a:rPr lang="es-ES" b="0" i="1" dirty="0" smtClean="0">
-                          <a:ln w="0"/>
-                          <a:solidFill>
-                            <a:srgbClr val="6DA4FA"/>
-                          </a:solidFill>
-                          <a:effectLst>
-                            <a:outerShdw blurRad="38100" dist="25400" dir="5400000" algn="ctr" rotWithShape="0">
-                              <a:srgbClr val="6E747A">
-                                <a:alpha val="43000"/>
-                              </a:srgbClr>
-                            </a:outerShdw>
-                          </a:effectLst>
-                          <a:latin typeface="Cambria Math" charset="0"/>
-                        </a:rPr>
-                        <m:t>,</m:t>
-                      </m:r>
-                      <m:sSup>
-                        <m:sSupPr>
-                          <m:ctrlPr>
                             <a:rPr lang="es-ES" b="0" i="1" dirty="0" smtClean="0">
                               <a:ln w="0"/>
                               <a:solidFill>
@@ -31680,7 +31480,7 @@
             </p:txBody>
           </p:sp>
         </mc:Choice>
-        <mc:Fallback xmlns="">
+        <mc:Fallback>
           <p:sp>
             <p:nvSpPr>
               <p:cNvPr id="96" name="Rectangle 95"/>
@@ -31719,6 +31519,44 @@
           </p:sp>
         </mc:Fallback>
       </mc:AlternateContent>
+      <p:sp>
+        <p:nvSpPr>
+          <p:cNvPr id="97" name="TextBox 96"/>
+          <p:cNvSpPr txBox="1"/>
+          <p:nvPr/>
+        </p:nvSpPr>
+        <p:spPr>
+          <a:xfrm>
+            <a:off x="-209572" y="4321314"/>
+            <a:ext cx="3581400" cy="707886"/>
+          </a:xfrm>
+          <a:prstGeom prst="rect">
+            <a:avLst/>
+          </a:prstGeom>
+          <a:noFill/>
+        </p:spPr>
+        <p:txBody>
+          <a:bodyPr wrap="square" rtlCol="0">
+            <a:spAutoFit/>
+          </a:bodyPr>
+          <a:lstStyle/>
+          <a:p>
+            <a:pPr algn="ctr"/>
+            <a:r>
+              <a:rPr lang="en-US" sz="2000" dirty="0" smtClean="0"/>
+              <a:t>Hidden Markov Model</a:t>
+            </a:r>
+          </a:p>
+          <a:p>
+            <a:pPr algn="ctr"/>
+            <a:r>
+              <a:rPr lang="en-US" sz="2000" dirty="0" smtClean="0"/>
+              <a:t>(Dynamic BN)</a:t>
+            </a:r>
+            <a:endParaRPr lang="en-US" sz="2000" dirty="0"/>
+          </a:p>
+        </p:txBody>
+      </p:sp>
     </p:spTree>
     <p:extLst>
       <p:ext uri="{BB962C8B-B14F-4D97-AF65-F5344CB8AC3E}">
@@ -31765,7 +31603,7 @@
         <p:spPr>
           <a:xfrm>
             <a:off x="457200" y="1905000"/>
-            <a:ext cx="8763000" cy="4185761"/>
+            <a:ext cx="8763000" cy="4401205"/>
           </a:xfrm>
           <a:prstGeom prst="rect">
             <a:avLst/>
@@ -31898,13 +31736,24 @@
             <a:br>
               <a:rPr lang="en-US" sz="1400" dirty="0"/>
             </a:br>
+            <a:endParaRPr lang="en-US" sz="1400" dirty="0" smtClean="0"/>
+          </a:p>
+          <a:p>
+            <a:r>
+              <a:rPr lang="en-US" sz="1400" i="1" dirty="0" smtClean="0">
+                <a:solidFill>
+                  <a:srgbClr val="808080"/>
+                </a:solidFill>
+              </a:rPr>
+              <a:t>//</a:t>
+            </a:r>
             <a:r>
               <a:rPr lang="en-US" sz="1400" i="1" dirty="0">
                 <a:solidFill>
                   <a:srgbClr val="808080"/>
                 </a:solidFill>
               </a:rPr>
-              <a:t>//Select the inference algorithm</a:t>
+              <a:t>Select the inference algorithm</a:t>
             </a:r>
             <a:br>
               <a:rPr lang="en-US" sz="1400" i="1" dirty="0">

</xml_diff>